<commit_message>
added reference to Con.4
</commit_message>
<xml_diff>
--- a/CppCoreGuidelines/C4GC.pptx
+++ b/CppCoreGuidelines/C4GC.pptx
@@ -16,8 +16,8 @@
     <p:sldId id="278" r:id="rId10"/>
     <p:sldId id="281" r:id="rId11"/>
     <p:sldId id="282" r:id="rId12"/>
-    <p:sldId id="264" r:id="rId13"/>
-    <p:sldId id="265" r:id="rId14"/>
+    <p:sldId id="283" r:id="rId13"/>
+    <p:sldId id="284" r:id="rId14"/>
     <p:sldId id="266" r:id="rId15"/>
     <p:sldId id="267" r:id="rId16"/>
     <p:sldId id="268" r:id="rId17"/>
@@ -26368,7 +26368,7 @@
           <a:p>
             <a:fld id="{0B1C1578-2820-4B56-BA0D-856688ED15CA}" type="datetimeFigureOut">
               <a:rPr lang="en-US" smtClean="0"/>
-              <a:t>22/01/18</a:t>
+              <a:t>25/01/18</a:t>
             </a:fld>
             <a:endParaRPr lang="en-US"/>
           </a:p>
@@ -42114,35 +42114,36 @@
         </p:nvSpPr>
         <p:spPr/>
         <p:txBody>
-          <a:bodyPr vert="horz" lIns="91440" tIns="45720" rIns="91440" bIns="45720" rtlCol="0" anchor="ctr">
+          <a:bodyPr>
             <a:normAutofit fontScale="90000"/>
           </a:bodyPr>
           <a:lstStyle/>
           <a:p>
             <a:r>
-              <a:rPr lang="en-US" b="1" dirty="0"/>
-              <a:t>ES.28: Use lambdas for complex initialization, especially of </a:t>
-            </a:r>
-            <a:r>
-              <a:rPr lang="en-US" b="1" dirty="0" err="1"/>
+              <a:rPr lang="en-US" dirty="0"/>
+              <a:t>Con.4: Use </a:t>
+            </a:r>
+            <a:r>
+              <a:rPr lang="en-US" dirty="0" err="1"/>
               <a:t>const</a:t>
             </a:r>
             <a:r>
-              <a:rPr lang="en-US" b="1" dirty="0"/>
-              <a:t> variables</a:t>
-            </a:r>
+              <a:rPr lang="en-US" dirty="0"/>
+              <a:t> to define objects with values that do not change after construction</a:t>
+            </a:r>
+            <a:endParaRPr lang="en-US" dirty="0"/>
           </a:p>
         </p:txBody>
       </p:sp>
       <p:sp>
         <p:nvSpPr>
-          <p:cNvPr id="3" name="TextBox 2"/>
+          <p:cNvPr id="4" name="TextBox 3"/>
           <p:cNvSpPr txBox="1"/>
           <p:nvPr/>
         </p:nvSpPr>
         <p:spPr>
           <a:xfrm>
-            <a:off x="838200" y="1912724"/>
+            <a:off x="699181" y="1894795"/>
             <a:ext cx="8866909" cy="1200329"/>
           </a:xfrm>
           <a:prstGeom prst="rect">
@@ -42423,7 +42424,7 @@
     </p:spTree>
     <p:extLst>
       <p:ext uri="{BB962C8B-B14F-4D97-AF65-F5344CB8AC3E}">
-        <p14:creationId xmlns:p14="http://schemas.microsoft.com/office/powerpoint/2010/main" val="3041049284"/>
+        <p14:creationId xmlns:p14="http://schemas.microsoft.com/office/powerpoint/2010/main" val="367926523"/>
       </p:ext>
     </p:extLst>
   </p:cSld>
@@ -42477,35 +42478,36 @@
         </p:nvSpPr>
         <p:spPr/>
         <p:txBody>
-          <a:bodyPr vert="horz" lIns="91440" tIns="45720" rIns="91440" bIns="45720" rtlCol="0" anchor="ctr">
+          <a:bodyPr>
             <a:normAutofit fontScale="90000"/>
           </a:bodyPr>
           <a:lstStyle/>
           <a:p>
             <a:r>
-              <a:rPr lang="en-US" b="1" dirty="0"/>
-              <a:t>ES.28: Use lambdas for complex initialization, especially of </a:t>
-            </a:r>
-            <a:r>
-              <a:rPr lang="en-US" b="1" dirty="0" err="1"/>
+              <a:rPr lang="en-US" dirty="0"/>
+              <a:t>Con.4: Use </a:t>
+            </a:r>
+            <a:r>
+              <a:rPr lang="en-US" dirty="0" err="1"/>
               <a:t>const</a:t>
             </a:r>
             <a:r>
-              <a:rPr lang="en-US" b="1" dirty="0"/>
-              <a:t> variables</a:t>
-            </a:r>
+              <a:rPr lang="en-US" dirty="0"/>
+              <a:t> to define objects with values that do not change after construction</a:t>
+            </a:r>
+            <a:endParaRPr lang="en-US" dirty="0"/>
           </a:p>
         </p:txBody>
       </p:sp>
       <p:sp>
         <p:nvSpPr>
-          <p:cNvPr id="3" name="TextBox 2"/>
+          <p:cNvPr id="4" name="TextBox 3"/>
           <p:cNvSpPr txBox="1"/>
           <p:nvPr/>
         </p:nvSpPr>
         <p:spPr>
           <a:xfrm>
-            <a:off x="838200" y="1912724"/>
+            <a:off x="699181" y="1894795"/>
             <a:ext cx="8866909" cy="1200329"/>
           </a:xfrm>
           <a:prstGeom prst="rect">
@@ -42540,7 +42542,7 @@
               <a:t> </a:t>
             </a:r>
             <a:r>
-              <a:rPr lang="en-US" dirty="0" smtClean="0">
+              <a:rPr lang="en-US" dirty="0">
                 <a:solidFill>
                   <a:srgbClr val="000080"/>
                 </a:solidFill>
@@ -42549,7 +42551,7 @@
               <a:t>x</a:t>
             </a:r>
             <a:r>
-              <a:rPr lang="en-US" dirty="0" smtClean="0">
+              <a:rPr lang="en-US" dirty="0">
                 <a:solidFill>
                   <a:srgbClr val="000000"/>
                 </a:solidFill>
@@ -42557,12 +42559,6 @@
               </a:rPr>
               <a:t>{};</a:t>
             </a:r>
-            <a:endParaRPr lang="en-US" dirty="0">
-              <a:solidFill>
-                <a:srgbClr val="000000"/>
-              </a:solidFill>
-              <a:latin typeface="Consolas" panose="020B0609020204030204" pitchFamily="49" charset="0"/>
-            </a:endParaRPr>
           </a:p>
           <a:p>
             <a:r>
@@ -42797,7 +42793,7 @@
         </p:nvSpPr>
         <p:spPr>
           <a:xfrm>
-            <a:off x="838200" y="4313382"/>
+            <a:off x="699181" y="4335812"/>
             <a:ext cx="9421091" cy="923330"/>
           </a:xfrm>
           <a:prstGeom prst="rect">
@@ -42867,13 +42863,13 @@
       </p:sp>
       <p:sp>
         <p:nvSpPr>
-          <p:cNvPr id="4" name="TextBox 3"/>
+          <p:cNvPr id="6" name="TextBox 5"/>
           <p:cNvSpPr txBox="1"/>
           <p:nvPr/>
         </p:nvSpPr>
         <p:spPr>
           <a:xfrm>
-            <a:off x="838200" y="3944050"/>
+            <a:off x="699181" y="3966480"/>
             <a:ext cx="3362037" cy="369332"/>
           </a:xfrm>
           <a:prstGeom prst="rect">
@@ -42901,7 +42897,7 @@
     </p:spTree>
     <p:extLst>
       <p:ext uri="{BB962C8B-B14F-4D97-AF65-F5344CB8AC3E}">
-        <p14:creationId xmlns:p14="http://schemas.microsoft.com/office/powerpoint/2010/main" val="2885074011"/>
+        <p14:creationId xmlns:p14="http://schemas.microsoft.com/office/powerpoint/2010/main" val="448487649"/>
       </p:ext>
     </p:extLst>
   </p:cSld>
@@ -42984,7 +42980,7 @@
         </p:nvSpPr>
         <p:spPr>
           <a:xfrm>
-            <a:off x="838200" y="1912724"/>
+            <a:off x="699181" y="1921688"/>
             <a:ext cx="8866909" cy="2031325"/>
           </a:xfrm>
           <a:prstGeom prst="rect">
@@ -47441,6 +47437,13 @@
       <p:transition/>
     </mc:Fallback>
   </mc:AlternateContent>
+  <p:timing>
+    <p:tnLst>
+      <p:par>
+        <p:cTn id="1" dur="indefinite" restart="never" nodeType="tmRoot"/>
+      </p:par>
+    </p:tnLst>
+  </p:timing>
 </p:sld>
 </file>
 
@@ -49007,7 +49010,6 @@
               <a:rPr lang="en-US" sz="1500" dirty="0"/>
               <a:t>  ^</a:t>
             </a:r>
-            <a:endParaRPr lang="en-US" sz="1500" dirty="0"/>
           </a:p>
         </p:txBody>
       </p:sp>
@@ -49037,7 +49039,6 @@
               <a:rPr lang="en-US" dirty="0" smtClean="0"/>
               <a:t>clang-tidy:</a:t>
             </a:r>
-            <a:endParaRPr lang="en-US" dirty="0" smtClean="0"/>
           </a:p>
         </p:txBody>
       </p:sp>

</xml_diff>